<commit_message>
Update the architecture. Simplify the log info
</commit_message>
<xml_diff>
--- a/architecture.pptx
+++ b/architecture.pptx
@@ -260,7 +260,7 @@
           <a:p>
             <a:fld id="{474C422C-BDF9-41D1-A812-954CCA4F011F}" type="datetimeFigureOut">
               <a:rPr lang="zh-CN" altLang="en-US" smtClean="0"/>
-              <a:t>2018/7/20</a:t>
+              <a:t>2018/7/23</a:t>
             </a:fld>
             <a:endParaRPr lang="zh-CN" altLang="en-US"/>
           </a:p>
@@ -458,7 +458,7 @@
           <a:p>
             <a:fld id="{474C422C-BDF9-41D1-A812-954CCA4F011F}" type="datetimeFigureOut">
               <a:rPr lang="zh-CN" altLang="en-US" smtClean="0"/>
-              <a:t>2018/7/20</a:t>
+              <a:t>2018/7/23</a:t>
             </a:fld>
             <a:endParaRPr lang="zh-CN" altLang="en-US"/>
           </a:p>
@@ -666,7 +666,7 @@
           <a:p>
             <a:fld id="{474C422C-BDF9-41D1-A812-954CCA4F011F}" type="datetimeFigureOut">
               <a:rPr lang="zh-CN" altLang="en-US" smtClean="0"/>
-              <a:t>2018/7/20</a:t>
+              <a:t>2018/7/23</a:t>
             </a:fld>
             <a:endParaRPr lang="zh-CN" altLang="en-US"/>
           </a:p>
@@ -864,7 +864,7 @@
           <a:p>
             <a:fld id="{474C422C-BDF9-41D1-A812-954CCA4F011F}" type="datetimeFigureOut">
               <a:rPr lang="zh-CN" altLang="en-US" smtClean="0"/>
-              <a:t>2018/7/20</a:t>
+              <a:t>2018/7/23</a:t>
             </a:fld>
             <a:endParaRPr lang="zh-CN" altLang="en-US"/>
           </a:p>
@@ -1139,7 +1139,7 @@
           <a:p>
             <a:fld id="{474C422C-BDF9-41D1-A812-954CCA4F011F}" type="datetimeFigureOut">
               <a:rPr lang="zh-CN" altLang="en-US" smtClean="0"/>
-              <a:t>2018/7/20</a:t>
+              <a:t>2018/7/23</a:t>
             </a:fld>
             <a:endParaRPr lang="zh-CN" altLang="en-US"/>
           </a:p>
@@ -1404,7 +1404,7 @@
           <a:p>
             <a:fld id="{474C422C-BDF9-41D1-A812-954CCA4F011F}" type="datetimeFigureOut">
               <a:rPr lang="zh-CN" altLang="en-US" smtClean="0"/>
-              <a:t>2018/7/20</a:t>
+              <a:t>2018/7/23</a:t>
             </a:fld>
             <a:endParaRPr lang="zh-CN" altLang="en-US"/>
           </a:p>
@@ -1816,7 +1816,7 @@
           <a:p>
             <a:fld id="{474C422C-BDF9-41D1-A812-954CCA4F011F}" type="datetimeFigureOut">
               <a:rPr lang="zh-CN" altLang="en-US" smtClean="0"/>
-              <a:t>2018/7/20</a:t>
+              <a:t>2018/7/23</a:t>
             </a:fld>
             <a:endParaRPr lang="zh-CN" altLang="en-US"/>
           </a:p>
@@ -1957,7 +1957,7 @@
           <a:p>
             <a:fld id="{474C422C-BDF9-41D1-A812-954CCA4F011F}" type="datetimeFigureOut">
               <a:rPr lang="zh-CN" altLang="en-US" smtClean="0"/>
-              <a:t>2018/7/20</a:t>
+              <a:t>2018/7/23</a:t>
             </a:fld>
             <a:endParaRPr lang="zh-CN" altLang="en-US"/>
           </a:p>
@@ -2070,7 +2070,7 @@
           <a:p>
             <a:fld id="{474C422C-BDF9-41D1-A812-954CCA4F011F}" type="datetimeFigureOut">
               <a:rPr lang="zh-CN" altLang="en-US" smtClean="0"/>
-              <a:t>2018/7/20</a:t>
+              <a:t>2018/7/23</a:t>
             </a:fld>
             <a:endParaRPr lang="zh-CN" altLang="en-US"/>
           </a:p>
@@ -2381,7 +2381,7 @@
           <a:p>
             <a:fld id="{474C422C-BDF9-41D1-A812-954CCA4F011F}" type="datetimeFigureOut">
               <a:rPr lang="zh-CN" altLang="en-US" smtClean="0"/>
-              <a:t>2018/7/20</a:t>
+              <a:t>2018/7/23</a:t>
             </a:fld>
             <a:endParaRPr lang="zh-CN" altLang="en-US"/>
           </a:p>
@@ -2669,7 +2669,7 @@
           <a:p>
             <a:fld id="{474C422C-BDF9-41D1-A812-954CCA4F011F}" type="datetimeFigureOut">
               <a:rPr lang="zh-CN" altLang="en-US" smtClean="0"/>
-              <a:t>2018/7/20</a:t>
+              <a:t>2018/7/23</a:t>
             </a:fld>
             <a:endParaRPr lang="zh-CN" altLang="en-US"/>
           </a:p>
@@ -2910,7 +2910,7 @@
           <a:p>
             <a:fld id="{474C422C-BDF9-41D1-A812-954CCA4F011F}" type="datetimeFigureOut">
               <a:rPr lang="zh-CN" altLang="en-US" smtClean="0"/>
-              <a:t>2018/7/20</a:t>
+              <a:t>2018/7/23</a:t>
             </a:fld>
             <a:endParaRPr lang="zh-CN" altLang="en-US"/>
           </a:p>
@@ -7416,96 +7416,6 @@
           </a:p>
         </p:txBody>
       </p:sp>
-      <p:cxnSp>
-        <p:nvCxnSpPr>
-          <p:cNvPr id="229" name="直接箭头连接符 228">
-            <a:extLst>
-              <a:ext uri="{FF2B5EF4-FFF2-40B4-BE49-F238E27FC236}">
-                <a16:creationId xmlns:a16="http://schemas.microsoft.com/office/drawing/2014/main" id="{1224F96F-A5C5-4930-B0CC-EAD20904CCA2}"/>
-              </a:ext>
-            </a:extLst>
-          </p:cNvPr>
-          <p:cNvCxnSpPr>
-            <a:cxnSpLocks/>
-          </p:cNvCxnSpPr>
-          <p:nvPr/>
-        </p:nvCxnSpPr>
-        <p:spPr>
-          <a:xfrm flipH="1">
-            <a:off x="4507519" y="5272586"/>
-            <a:ext cx="2707778" cy="0"/>
-          </a:xfrm>
-          <a:prstGeom prst="straightConnector1">
-            <a:avLst/>
-          </a:prstGeom>
-          <a:ln w="12700">
-            <a:solidFill>
-              <a:schemeClr val="accent2"/>
-            </a:solidFill>
-            <a:tailEnd type="triangle"/>
-          </a:ln>
-        </p:spPr>
-        <p:style>
-          <a:lnRef idx="1">
-            <a:schemeClr val="accent1"/>
-          </a:lnRef>
-          <a:fillRef idx="0">
-            <a:schemeClr val="accent1"/>
-          </a:fillRef>
-          <a:effectRef idx="0">
-            <a:schemeClr val="accent1"/>
-          </a:effectRef>
-          <a:fontRef idx="minor">
-            <a:schemeClr val="tx1"/>
-          </a:fontRef>
-        </p:style>
-      </p:cxnSp>
-      <p:cxnSp>
-        <p:nvCxnSpPr>
-          <p:cNvPr id="232" name="连接符: 肘形 231">
-            <a:extLst>
-              <a:ext uri="{FF2B5EF4-FFF2-40B4-BE49-F238E27FC236}">
-                <a16:creationId xmlns:a16="http://schemas.microsoft.com/office/drawing/2014/main" id="{B4E774DD-F9E6-4027-9C2B-16BAB6AD3185}"/>
-              </a:ext>
-            </a:extLst>
-          </p:cNvPr>
-          <p:cNvCxnSpPr>
-            <a:endCxn id="141" idx="2"/>
-          </p:cNvCxnSpPr>
-          <p:nvPr/>
-        </p:nvCxnSpPr>
-        <p:spPr>
-          <a:xfrm rot="5400000" flipH="1" flipV="1">
-            <a:off x="8056887" y="4394899"/>
-            <a:ext cx="1012574" cy="795476"/>
-          </a:xfrm>
-          <a:prstGeom prst="bentConnector3">
-            <a:avLst>
-              <a:gd name="adj1" fmla="val 658"/>
-            </a:avLst>
-          </a:prstGeom>
-          <a:ln w="12700">
-            <a:solidFill>
-              <a:schemeClr val="accent2"/>
-            </a:solidFill>
-            <a:tailEnd type="triangle"/>
-          </a:ln>
-        </p:spPr>
-        <p:style>
-          <a:lnRef idx="1">
-            <a:schemeClr val="accent1"/>
-          </a:lnRef>
-          <a:fillRef idx="0">
-            <a:schemeClr val="accent1"/>
-          </a:fillRef>
-          <a:effectRef idx="0">
-            <a:schemeClr val="accent1"/>
-          </a:effectRef>
-          <a:fontRef idx="minor">
-            <a:schemeClr val="tx1"/>
-          </a:fontRef>
-        </p:style>
-      </p:cxnSp>
       <p:sp>
         <p:nvSpPr>
           <p:cNvPr id="234" name="文本框 233">
@@ -7520,7 +7430,7 @@
         </p:nvSpPr>
         <p:spPr>
           <a:xfrm>
-            <a:off x="8199056" y="5308458"/>
+            <a:off x="8197649" y="5186794"/>
             <a:ext cx="1739139" cy="276999"/>
           </a:xfrm>
           <a:prstGeom prst="rect">
@@ -7552,52 +7462,6 @@
           </a:p>
         </p:txBody>
       </p:sp>
-      <p:cxnSp>
-        <p:nvCxnSpPr>
-          <p:cNvPr id="236" name="连接符: 肘形 235">
-            <a:extLst>
-              <a:ext uri="{FF2B5EF4-FFF2-40B4-BE49-F238E27FC236}">
-                <a16:creationId xmlns:a16="http://schemas.microsoft.com/office/drawing/2014/main" id="{0A3B459A-4C84-4D6B-8F59-93A7381C1AD2}"/>
-              </a:ext>
-            </a:extLst>
-          </p:cNvPr>
-          <p:cNvCxnSpPr>
-            <a:cxnSpLocks/>
-            <a:stCxn id="149" idx="3"/>
-            <a:endCxn id="213" idx="0"/>
-          </p:cNvCxnSpPr>
-          <p:nvPr/>
-        </p:nvCxnSpPr>
-        <p:spPr>
-          <a:xfrm>
-            <a:off x="6812916" y="3666619"/>
-            <a:ext cx="876923" cy="1018690"/>
-          </a:xfrm>
-          <a:prstGeom prst="bentConnector2">
-            <a:avLst/>
-          </a:prstGeom>
-          <a:ln w="12700">
-            <a:solidFill>
-              <a:schemeClr val="accent2"/>
-            </a:solidFill>
-            <a:tailEnd type="triangle"/>
-          </a:ln>
-        </p:spPr>
-        <p:style>
-          <a:lnRef idx="1">
-            <a:schemeClr val="accent1"/>
-          </a:lnRef>
-          <a:fillRef idx="0">
-            <a:schemeClr val="accent1"/>
-          </a:fillRef>
-          <a:effectRef idx="0">
-            <a:schemeClr val="accent1"/>
-          </a:effectRef>
-          <a:fontRef idx="minor">
-            <a:schemeClr val="tx1"/>
-          </a:fontRef>
-        </p:style>
-      </p:cxnSp>
       <p:sp>
         <p:nvSpPr>
           <p:cNvPr id="239" name="文本框 238">
@@ -7658,7 +7522,7 @@
         </p:nvSpPr>
         <p:spPr>
           <a:xfrm>
-            <a:off x="8405473" y="4967775"/>
+            <a:off x="8418218" y="4849248"/>
             <a:ext cx="498539" cy="276999"/>
           </a:xfrm>
           <a:prstGeom prst="rect">
@@ -8096,6 +7960,133 @@
             <a:ext cx="0" cy="655433"/>
           </a:xfrm>
           <a:prstGeom prst="straightConnector1">
+            <a:avLst/>
+          </a:prstGeom>
+          <a:ln w="12700">
+            <a:solidFill>
+              <a:schemeClr val="accent2"/>
+            </a:solidFill>
+            <a:tailEnd type="triangle"/>
+          </a:ln>
+        </p:spPr>
+        <p:style>
+          <a:lnRef idx="1">
+            <a:schemeClr val="accent1"/>
+          </a:lnRef>
+          <a:fillRef idx="0">
+            <a:schemeClr val="accent1"/>
+          </a:fillRef>
+          <a:effectRef idx="0">
+            <a:schemeClr val="accent1"/>
+          </a:effectRef>
+          <a:fontRef idx="minor">
+            <a:schemeClr val="tx1"/>
+          </a:fontRef>
+        </p:style>
+      </p:cxnSp>
+      <p:cxnSp>
+        <p:nvCxnSpPr>
+          <p:cNvPr id="136" name="连接符: 肘形 135">
+            <a:extLst>
+              <a:ext uri="{FF2B5EF4-FFF2-40B4-BE49-F238E27FC236}">
+                <a16:creationId xmlns:a16="http://schemas.microsoft.com/office/drawing/2014/main" id="{AA51A0E5-A4DB-4AA3-BD56-702FF13BBC80}"/>
+              </a:ext>
+            </a:extLst>
+          </p:cNvPr>
+          <p:cNvCxnSpPr/>
+          <p:nvPr/>
+        </p:nvCxnSpPr>
+        <p:spPr>
+          <a:xfrm flipV="1">
+            <a:off x="8257005" y="4286350"/>
+            <a:ext cx="703907" cy="830006"/>
+          </a:xfrm>
+          <a:prstGeom prst="bentConnector2">
+            <a:avLst/>
+          </a:prstGeom>
+          <a:ln w="12700">
+            <a:solidFill>
+              <a:schemeClr val="accent2"/>
+            </a:solidFill>
+            <a:headEnd type="triangle"/>
+            <a:tailEnd type="triangle"/>
+          </a:ln>
+        </p:spPr>
+        <p:style>
+          <a:lnRef idx="1">
+            <a:schemeClr val="accent1"/>
+          </a:lnRef>
+          <a:fillRef idx="0">
+            <a:schemeClr val="accent1"/>
+          </a:fillRef>
+          <a:effectRef idx="0">
+            <a:schemeClr val="accent1"/>
+          </a:effectRef>
+          <a:fontRef idx="minor">
+            <a:schemeClr val="tx1"/>
+          </a:fontRef>
+        </p:style>
+      </p:cxnSp>
+      <p:cxnSp>
+        <p:nvCxnSpPr>
+          <p:cNvPr id="139" name="直接箭头连接符 138">
+            <a:extLst>
+              <a:ext uri="{FF2B5EF4-FFF2-40B4-BE49-F238E27FC236}">
+                <a16:creationId xmlns:a16="http://schemas.microsoft.com/office/drawing/2014/main" id="{2E717FEA-7486-4B02-9C21-07CCCA759D98}"/>
+              </a:ext>
+            </a:extLst>
+          </p:cNvPr>
+          <p:cNvCxnSpPr/>
+          <p:nvPr/>
+        </p:nvCxnSpPr>
+        <p:spPr>
+          <a:xfrm>
+            <a:off x="4507519" y="5248186"/>
+            <a:ext cx="2707778" cy="0"/>
+          </a:xfrm>
+          <a:prstGeom prst="straightConnector1">
+            <a:avLst/>
+          </a:prstGeom>
+          <a:ln w="12700">
+            <a:solidFill>
+              <a:schemeClr val="accent2"/>
+            </a:solidFill>
+            <a:tailEnd type="triangle"/>
+          </a:ln>
+        </p:spPr>
+        <p:style>
+          <a:lnRef idx="1">
+            <a:schemeClr val="accent1"/>
+          </a:lnRef>
+          <a:fillRef idx="0">
+            <a:schemeClr val="accent1"/>
+          </a:fillRef>
+          <a:effectRef idx="0">
+            <a:schemeClr val="accent1"/>
+          </a:effectRef>
+          <a:fontRef idx="minor">
+            <a:schemeClr val="tx1"/>
+          </a:fontRef>
+        </p:style>
+      </p:cxnSp>
+      <p:cxnSp>
+        <p:nvCxnSpPr>
+          <p:cNvPr id="143" name="连接符: 肘形 142">
+            <a:extLst>
+              <a:ext uri="{FF2B5EF4-FFF2-40B4-BE49-F238E27FC236}">
+                <a16:creationId xmlns:a16="http://schemas.microsoft.com/office/drawing/2014/main" id="{CABCE4B3-5209-45B6-B542-2121A33870FD}"/>
+              </a:ext>
+            </a:extLst>
+          </p:cNvPr>
+          <p:cNvCxnSpPr/>
+          <p:nvPr/>
+        </p:nvCxnSpPr>
+        <p:spPr>
+          <a:xfrm rot="16200000" flipV="1">
+            <a:off x="6733971" y="3747957"/>
+            <a:ext cx="1018690" cy="876923"/>
+          </a:xfrm>
+          <a:prstGeom prst="bentConnector2">
             <a:avLst/>
           </a:prstGeom>
           <a:ln w="12700">
@@ -12177,7 +12168,7 @@
         </p:nvSpPr>
         <p:spPr>
           <a:xfrm>
-            <a:off x="5557276" y="4903796"/>
+            <a:off x="5268336" y="5016131"/>
             <a:ext cx="1658021" cy="276999"/>
           </a:xfrm>
           <a:prstGeom prst="rect">
@@ -12203,96 +12194,6 @@
           </a:p>
         </p:txBody>
       </p:sp>
-      <p:cxnSp>
-        <p:nvCxnSpPr>
-          <p:cNvPr id="229" name="直接箭头连接符 228">
-            <a:extLst>
-              <a:ext uri="{FF2B5EF4-FFF2-40B4-BE49-F238E27FC236}">
-                <a16:creationId xmlns:a16="http://schemas.microsoft.com/office/drawing/2014/main" id="{1224F96F-A5C5-4930-B0CC-EAD20904CCA2}"/>
-              </a:ext>
-            </a:extLst>
-          </p:cNvPr>
-          <p:cNvCxnSpPr>
-            <a:cxnSpLocks/>
-          </p:cNvCxnSpPr>
-          <p:nvPr/>
-        </p:nvCxnSpPr>
-        <p:spPr>
-          <a:xfrm flipH="1">
-            <a:off x="4507519" y="5272586"/>
-            <a:ext cx="2707778" cy="0"/>
-          </a:xfrm>
-          <a:prstGeom prst="straightConnector1">
-            <a:avLst/>
-          </a:prstGeom>
-          <a:ln w="12700">
-            <a:solidFill>
-              <a:schemeClr val="tx1"/>
-            </a:solidFill>
-            <a:tailEnd type="triangle"/>
-          </a:ln>
-        </p:spPr>
-        <p:style>
-          <a:lnRef idx="1">
-            <a:schemeClr val="accent1"/>
-          </a:lnRef>
-          <a:fillRef idx="0">
-            <a:schemeClr val="accent1"/>
-          </a:fillRef>
-          <a:effectRef idx="0">
-            <a:schemeClr val="accent1"/>
-          </a:effectRef>
-          <a:fontRef idx="minor">
-            <a:schemeClr val="tx1"/>
-          </a:fontRef>
-        </p:style>
-      </p:cxnSp>
-      <p:cxnSp>
-        <p:nvCxnSpPr>
-          <p:cNvPr id="232" name="连接符: 肘形 231">
-            <a:extLst>
-              <a:ext uri="{FF2B5EF4-FFF2-40B4-BE49-F238E27FC236}">
-                <a16:creationId xmlns:a16="http://schemas.microsoft.com/office/drawing/2014/main" id="{B4E774DD-F9E6-4027-9C2B-16BAB6AD3185}"/>
-              </a:ext>
-            </a:extLst>
-          </p:cNvPr>
-          <p:cNvCxnSpPr>
-            <a:endCxn id="141" idx="2"/>
-          </p:cNvCxnSpPr>
-          <p:nvPr/>
-        </p:nvCxnSpPr>
-        <p:spPr>
-          <a:xfrm rot="5400000" flipH="1" flipV="1">
-            <a:off x="8056887" y="4394899"/>
-            <a:ext cx="1012574" cy="795476"/>
-          </a:xfrm>
-          <a:prstGeom prst="bentConnector3">
-            <a:avLst>
-              <a:gd name="adj1" fmla="val 658"/>
-            </a:avLst>
-          </a:prstGeom>
-          <a:ln w="12700">
-            <a:solidFill>
-              <a:schemeClr val="tx1"/>
-            </a:solidFill>
-            <a:tailEnd type="triangle"/>
-          </a:ln>
-        </p:spPr>
-        <p:style>
-          <a:lnRef idx="1">
-            <a:schemeClr val="accent1"/>
-          </a:lnRef>
-          <a:fillRef idx="0">
-            <a:schemeClr val="accent1"/>
-          </a:fillRef>
-          <a:effectRef idx="0">
-            <a:schemeClr val="accent1"/>
-          </a:effectRef>
-          <a:fontRef idx="minor">
-            <a:schemeClr val="tx1"/>
-          </a:fontRef>
-        </p:style>
-      </p:cxnSp>
       <p:sp>
         <p:nvSpPr>
           <p:cNvPr id="234" name="文本框 233">
@@ -12307,7 +12208,7 @@
         </p:nvSpPr>
         <p:spPr>
           <a:xfrm>
-            <a:off x="8199056" y="5308458"/>
+            <a:off x="8199056" y="5186794"/>
             <a:ext cx="1739139" cy="276999"/>
           </a:xfrm>
           <a:prstGeom prst="rect">
@@ -12333,52 +12234,6 @@
           </a:p>
         </p:txBody>
       </p:sp>
-      <p:cxnSp>
-        <p:nvCxnSpPr>
-          <p:cNvPr id="236" name="连接符: 肘形 235">
-            <a:extLst>
-              <a:ext uri="{FF2B5EF4-FFF2-40B4-BE49-F238E27FC236}">
-                <a16:creationId xmlns:a16="http://schemas.microsoft.com/office/drawing/2014/main" id="{0A3B459A-4C84-4D6B-8F59-93A7381C1AD2}"/>
-              </a:ext>
-            </a:extLst>
-          </p:cNvPr>
-          <p:cNvCxnSpPr>
-            <a:cxnSpLocks/>
-            <a:stCxn id="149" idx="3"/>
-            <a:endCxn id="213" idx="0"/>
-          </p:cNvCxnSpPr>
-          <p:nvPr/>
-        </p:nvCxnSpPr>
-        <p:spPr>
-          <a:xfrm>
-            <a:off x="6812916" y="3666619"/>
-            <a:ext cx="876923" cy="1018690"/>
-          </a:xfrm>
-          <a:prstGeom prst="bentConnector2">
-            <a:avLst/>
-          </a:prstGeom>
-          <a:ln w="12700">
-            <a:solidFill>
-              <a:schemeClr val="tx1"/>
-            </a:solidFill>
-            <a:tailEnd type="triangle"/>
-          </a:ln>
-        </p:spPr>
-        <p:style>
-          <a:lnRef idx="1">
-            <a:schemeClr val="accent1"/>
-          </a:lnRef>
-          <a:fillRef idx="0">
-            <a:schemeClr val="accent1"/>
-          </a:fillRef>
-          <a:effectRef idx="0">
-            <a:schemeClr val="accent1"/>
-          </a:effectRef>
-          <a:fontRef idx="minor">
-            <a:schemeClr val="tx1"/>
-          </a:fontRef>
-        </p:style>
-      </p:cxnSp>
       <p:sp>
         <p:nvSpPr>
           <p:cNvPr id="239" name="文本框 238">
@@ -12393,7 +12248,7 @@
         </p:nvSpPr>
         <p:spPr>
           <a:xfrm>
-            <a:off x="6947222" y="3427278"/>
+            <a:off x="7039449" y="3428999"/>
             <a:ext cx="498539" cy="276999"/>
           </a:xfrm>
           <a:prstGeom prst="rect">
@@ -12433,7 +12288,7 @@
         </p:nvSpPr>
         <p:spPr>
           <a:xfrm>
-            <a:off x="8405473" y="4967775"/>
+            <a:off x="8395903" y="4825506"/>
             <a:ext cx="498539" cy="276999"/>
           </a:xfrm>
           <a:prstGeom prst="rect">
@@ -12889,6 +12744,139 @@
           </a:fontRef>
         </p:style>
       </p:cxnSp>
+      <p:cxnSp>
+        <p:nvCxnSpPr>
+          <p:cNvPr id="14" name="连接符: 肘形 13">
+            <a:extLst>
+              <a:ext uri="{FF2B5EF4-FFF2-40B4-BE49-F238E27FC236}">
+                <a16:creationId xmlns:a16="http://schemas.microsoft.com/office/drawing/2014/main" id="{0994527D-0C8F-424C-B3AE-62201EBC1080}"/>
+              </a:ext>
+            </a:extLst>
+          </p:cNvPr>
+          <p:cNvCxnSpPr>
+            <a:stCxn id="213" idx="3"/>
+            <a:endCxn id="141" idx="2"/>
+          </p:cNvCxnSpPr>
+          <p:nvPr/>
+        </p:nvCxnSpPr>
+        <p:spPr>
+          <a:xfrm flipV="1">
+            <a:off x="8257005" y="4286350"/>
+            <a:ext cx="703907" cy="830006"/>
+          </a:xfrm>
+          <a:prstGeom prst="bentConnector2">
+            <a:avLst/>
+          </a:prstGeom>
+          <a:ln>
+            <a:solidFill>
+              <a:schemeClr val="tx1"/>
+            </a:solidFill>
+            <a:headEnd type="triangle"/>
+            <a:tailEnd type="triangle"/>
+          </a:ln>
+        </p:spPr>
+        <p:style>
+          <a:lnRef idx="1">
+            <a:schemeClr val="accent1"/>
+          </a:lnRef>
+          <a:fillRef idx="0">
+            <a:schemeClr val="accent1"/>
+          </a:fillRef>
+          <a:effectRef idx="0">
+            <a:schemeClr val="accent1"/>
+          </a:effectRef>
+          <a:fontRef idx="minor">
+            <a:schemeClr val="tx1"/>
+          </a:fontRef>
+        </p:style>
+      </p:cxnSp>
+      <p:cxnSp>
+        <p:nvCxnSpPr>
+          <p:cNvPr id="29" name="直接箭头连接符 28">
+            <a:extLst>
+              <a:ext uri="{FF2B5EF4-FFF2-40B4-BE49-F238E27FC236}">
+                <a16:creationId xmlns:a16="http://schemas.microsoft.com/office/drawing/2014/main" id="{518F0E5B-7274-4F3D-949E-8AA7297AF067}"/>
+              </a:ext>
+            </a:extLst>
+          </p:cNvPr>
+          <p:cNvCxnSpPr/>
+          <p:nvPr/>
+        </p:nvCxnSpPr>
+        <p:spPr>
+          <a:xfrm>
+            <a:off x="4507519" y="5298924"/>
+            <a:ext cx="2707778" cy="0"/>
+          </a:xfrm>
+          <a:prstGeom prst="straightConnector1">
+            <a:avLst/>
+          </a:prstGeom>
+          <a:ln w="12700">
+            <a:solidFill>
+              <a:schemeClr val="tx1"/>
+            </a:solidFill>
+            <a:tailEnd type="triangle"/>
+          </a:ln>
+        </p:spPr>
+        <p:style>
+          <a:lnRef idx="1">
+            <a:schemeClr val="accent1"/>
+          </a:lnRef>
+          <a:fillRef idx="0">
+            <a:schemeClr val="accent1"/>
+          </a:fillRef>
+          <a:effectRef idx="0">
+            <a:schemeClr val="accent1"/>
+          </a:effectRef>
+          <a:fontRef idx="minor">
+            <a:schemeClr val="tx1"/>
+          </a:fontRef>
+        </p:style>
+      </p:cxnSp>
+      <p:cxnSp>
+        <p:nvCxnSpPr>
+          <p:cNvPr id="31" name="连接符: 肘形 30">
+            <a:extLst>
+              <a:ext uri="{FF2B5EF4-FFF2-40B4-BE49-F238E27FC236}">
+                <a16:creationId xmlns:a16="http://schemas.microsoft.com/office/drawing/2014/main" id="{82A3D6DD-04DC-4D80-B5A9-D914432E2B12}"/>
+              </a:ext>
+            </a:extLst>
+          </p:cNvPr>
+          <p:cNvCxnSpPr>
+            <a:stCxn id="213" idx="0"/>
+            <a:endCxn id="149" idx="3"/>
+          </p:cNvCxnSpPr>
+          <p:nvPr/>
+        </p:nvCxnSpPr>
+        <p:spPr>
+          <a:xfrm rot="16200000" flipV="1">
+            <a:off x="6742033" y="3737502"/>
+            <a:ext cx="1018690" cy="876923"/>
+          </a:xfrm>
+          <a:prstGeom prst="bentConnector2">
+            <a:avLst/>
+          </a:prstGeom>
+          <a:ln w="12700">
+            <a:solidFill>
+              <a:schemeClr val="tx1"/>
+            </a:solidFill>
+            <a:tailEnd type="triangle"/>
+          </a:ln>
+        </p:spPr>
+        <p:style>
+          <a:lnRef idx="1">
+            <a:schemeClr val="accent1"/>
+          </a:lnRef>
+          <a:fillRef idx="0">
+            <a:schemeClr val="accent1"/>
+          </a:fillRef>
+          <a:effectRef idx="0">
+            <a:schemeClr val="accent1"/>
+          </a:effectRef>
+          <a:fontRef idx="minor">
+            <a:schemeClr val="tx1"/>
+          </a:fontRef>
+        </p:style>
+      </p:cxnSp>
     </p:spTree>
     <p:extLst>
       <p:ext uri="{BB962C8B-B14F-4D97-AF65-F5344CB8AC3E}">

</xml_diff>